<commit_message>
add mixed irt slides and PIRLS data
</commit_message>
<xml_diff>
--- a/slides/Tag1_2Nachmittag_Nr1_Uebungen/02_Uebung_einfache_IRT-Modelle_in_R.pptx
+++ b/slides/Tag1_2Nachmittag_Nr1_Uebungen/02_Uebung_einfache_IRT-Modelle_in_R.pptx
@@ -327,7 +327,7 @@
               <a:pPr>
                 <a:defRPr/>
               </a:pPr>
-              <a:t>23.09.2024</a:t>
+              <a:t>13.10.2024</a:t>
             </a:fld>
             <a:endParaRPr lang="de-DE"/>
           </a:p>
@@ -525,7 +525,7 @@
               <a:pPr>
                 <a:defRPr/>
               </a:pPr>
-              <a:t>23.09.2024</a:t>
+              <a:t>13.10.2024</a:t>
             </a:fld>
             <a:endParaRPr lang="de-DE"/>
           </a:p>
@@ -10375,7 +10375,7 @@
               <a:pPr>
                 <a:defRPr/>
               </a:pPr>
-              <a:t>23.09.2024</a:t>
+              <a:t>13.10.2024</a:t>
             </a:fld>
             <a:endParaRPr lang="de-DE" dirty="0"/>
           </a:p>
@@ -29279,29 +29279,37 @@
                 <a:ea typeface="Cambria" panose="02040503050406030204" pitchFamily="18" charset="0"/>
                 <a:cs typeface="Times New Roman" panose="02020603050405020304" pitchFamily="18" charset="0"/>
               </a:rPr>
-              <a:t> reshape2</a:t>
-            </a:r>
-            <a:r>
-              <a:rPr lang="en-US" sz="1200" b="1" dirty="0">
-                <a:solidFill>
-                  <a:srgbClr val="CE5C00"/>
-                </a:solidFill>
+              <a:t> </a:t>
+            </a:r>
+            <a:r>
+              <a:rPr lang="en-US" sz="1200" dirty="0" err="1">
                 <a:latin typeface="Consolas" panose="020B0609020204030204" pitchFamily="49" charset="0"/>
                 <a:ea typeface="Cambria" panose="02040503050406030204" pitchFamily="18" charset="0"/>
                 <a:cs typeface="Times New Roman" panose="02020603050405020304" pitchFamily="18" charset="0"/>
               </a:rPr>
-              <a:t>::</a:t>
-            </a:r>
-            <a:r>
-              <a:rPr lang="en-US" sz="1200" b="1" dirty="0" err="1">
-                <a:solidFill>
-                  <a:srgbClr val="204A87"/>
+              <a:t>tidyr</a:t>
+            </a:r>
+            <a:r>
+              <a:rPr lang="en-US" sz="1200" b="1" dirty="0">
+                <a:solidFill>
+                  <a:srgbClr val="CE5C00"/>
                 </a:solidFill>
                 <a:latin typeface="Consolas" panose="020B0609020204030204" pitchFamily="49" charset="0"/>
                 <a:ea typeface="Cambria" panose="02040503050406030204" pitchFamily="18" charset="0"/>
                 <a:cs typeface="Times New Roman" panose="02020603050405020304" pitchFamily="18" charset="0"/>
               </a:rPr>
-              <a:t>dcast</a:t>
+              <a:t>::</a:t>
+            </a:r>
+            <a:r>
+              <a:rPr lang="en-US" sz="1200" b="1" dirty="0" err="1">
+                <a:solidFill>
+                  <a:srgbClr val="204A87"/>
+                </a:solidFill>
+                <a:latin typeface="Consolas" panose="020B0609020204030204" pitchFamily="49" charset="0"/>
+                <a:ea typeface="Cambria" panose="02040503050406030204" pitchFamily="18" charset="0"/>
+                <a:cs typeface="Times New Roman" panose="02020603050405020304" pitchFamily="18" charset="0"/>
+              </a:rPr>
+              <a:t>pivot_wider</a:t>
             </a:r>
             <a:r>
               <a:rPr lang="en-US" sz="1200" dirty="0">
@@ -29389,7 +29397,7 @@
                 <a:ea typeface="Cambria" panose="02040503050406030204" pitchFamily="18" charset="0"/>
                 <a:cs typeface="Times New Roman" panose="02020603050405020304" pitchFamily="18" charset="0"/>
               </a:rPr>
-              <a:t>idstud</a:t>
+              <a:t>id.cols</a:t>
             </a:r>
             <a:r>
               <a:rPr lang="en-US" sz="1200" dirty="0">
@@ -29397,18 +29405,18 @@
                 <a:ea typeface="Cambria" panose="02040503050406030204" pitchFamily="18" charset="0"/>
                 <a:cs typeface="Times New Roman" panose="02020603050405020304" pitchFamily="18" charset="0"/>
               </a:rPr>
-              <a:t> </a:t>
+              <a:t> = </a:t>
             </a:r>
             <a:r>
               <a:rPr lang="en-US" sz="1200" b="1" dirty="0">
                 <a:solidFill>
-                  <a:srgbClr val="CE5C00"/>
+                  <a:srgbClr val="204A87"/>
                 </a:solidFill>
                 <a:latin typeface="Consolas" panose="020B0609020204030204" pitchFamily="49" charset="0"/>
                 <a:ea typeface="Cambria" panose="02040503050406030204" pitchFamily="18" charset="0"/>
                 <a:cs typeface="Times New Roman" panose="02020603050405020304" pitchFamily="18" charset="0"/>
               </a:rPr>
-              <a:t>+ </a:t>
+              <a:t>c</a:t>
             </a:r>
             <a:r>
               <a:rPr lang="en-US" sz="1200" dirty="0">
@@ -29416,26 +29424,40 @@
                 <a:ea typeface="Cambria" panose="02040503050406030204" pitchFamily="18" charset="0"/>
                 <a:cs typeface="Times New Roman" panose="02020603050405020304" pitchFamily="18" charset="0"/>
               </a:rPr>
-              <a:t>sex </a:t>
-            </a:r>
-            <a:r>
-              <a:rPr lang="en-US" sz="1200" b="1" dirty="0">
-                <a:solidFill>
-                  <a:srgbClr val="CE5C00"/>
+              <a:t>(</a:t>
+            </a:r>
+            <a:r>
+              <a:rPr lang="en-US" sz="1200" dirty="0">
+                <a:solidFill>
+                  <a:srgbClr val="4E9A06"/>
                 </a:solidFill>
                 <a:latin typeface="Consolas" panose="020B0609020204030204" pitchFamily="49" charset="0"/>
                 <a:ea typeface="Cambria" panose="02040503050406030204" pitchFamily="18" charset="0"/>
                 <a:cs typeface="Times New Roman" panose="02020603050405020304" pitchFamily="18" charset="0"/>
               </a:rPr>
-              <a:t>+ </a:t>
+              <a:t>"</a:t>
             </a:r>
             <a:r>
               <a:rPr lang="en-US" sz="1200" dirty="0" err="1">
+                <a:solidFill>
+                  <a:srgbClr val="4E9A06"/>
+                </a:solidFill>
                 <a:latin typeface="Consolas" panose="020B0609020204030204" pitchFamily="49" charset="0"/>
                 <a:ea typeface="Cambria" panose="02040503050406030204" pitchFamily="18" charset="0"/>
                 <a:cs typeface="Times New Roman" panose="02020603050405020304" pitchFamily="18" charset="0"/>
               </a:rPr>
-              <a:t>ses</a:t>
+              <a:t>idstud</a:t>
+            </a:r>
+            <a:r>
+              <a:rPr lang="en-US" sz="1200" dirty="0">
+                <a:solidFill>
+                  <a:srgbClr val="4E9A06"/>
+                </a:solidFill>
+                <a:latin typeface="Consolas" panose="020B0609020204030204" pitchFamily="49" charset="0"/>
+                <a:ea typeface="Cambria" panose="02040503050406030204" pitchFamily="18" charset="0"/>
+                <a:cs typeface="Times New Roman" panose="02020603050405020304" pitchFamily="18" charset="0"/>
+              </a:rPr>
+              <a:t>"</a:t>
             </a:r>
             <a:r>
               <a:rPr lang="en-US" sz="1200" dirty="0">
@@ -29443,18 +29465,18 @@
                 <a:ea typeface="Cambria" panose="02040503050406030204" pitchFamily="18" charset="0"/>
                 <a:cs typeface="Times New Roman" panose="02020603050405020304" pitchFamily="18" charset="0"/>
               </a:rPr>
-              <a:t> </a:t>
-            </a:r>
-            <a:r>
-              <a:rPr lang="en-US" sz="1200" b="1" dirty="0">
-                <a:solidFill>
-                  <a:srgbClr val="CE5C00"/>
+              <a:t>, </a:t>
+            </a:r>
+            <a:r>
+              <a:rPr lang="en-US" sz="1200" dirty="0">
+                <a:solidFill>
+                  <a:srgbClr val="4E9A06"/>
                 </a:solidFill>
                 <a:latin typeface="Consolas" panose="020B0609020204030204" pitchFamily="49" charset="0"/>
                 <a:ea typeface="Cambria" panose="02040503050406030204" pitchFamily="18" charset="0"/>
                 <a:cs typeface="Times New Roman" panose="02020603050405020304" pitchFamily="18" charset="0"/>
               </a:rPr>
-              <a:t>+ </a:t>
+              <a:t>"sex"</a:t>
             </a:r>
             <a:r>
               <a:rPr lang="en-US" sz="1200" dirty="0">
@@ -29462,18 +29484,40 @@
                 <a:ea typeface="Cambria" panose="02040503050406030204" pitchFamily="18" charset="0"/>
                 <a:cs typeface="Times New Roman" panose="02020603050405020304" pitchFamily="18" charset="0"/>
               </a:rPr>
-              <a:t>country </a:t>
-            </a:r>
-            <a:r>
-              <a:rPr lang="en-US" sz="1200" b="1" dirty="0">
-                <a:solidFill>
-                  <a:srgbClr val="CE5C00"/>
+              <a:t>, </a:t>
+            </a:r>
+            <a:r>
+              <a:rPr lang="en-US" sz="1200" dirty="0">
+                <a:solidFill>
+                  <a:srgbClr val="4E9A06"/>
                 </a:solidFill>
                 <a:latin typeface="Consolas" panose="020B0609020204030204" pitchFamily="49" charset="0"/>
                 <a:ea typeface="Cambria" panose="02040503050406030204" pitchFamily="18" charset="0"/>
                 <a:cs typeface="Times New Roman" panose="02020603050405020304" pitchFamily="18" charset="0"/>
               </a:rPr>
-              <a:t>~ </a:t>
+              <a:t>"</a:t>
+            </a:r>
+            <a:r>
+              <a:rPr lang="en-US" sz="1200" dirty="0" err="1">
+                <a:solidFill>
+                  <a:srgbClr val="4E9A06"/>
+                </a:solidFill>
+                <a:latin typeface="Consolas" panose="020B0609020204030204" pitchFamily="49" charset="0"/>
+                <a:ea typeface="Cambria" panose="02040503050406030204" pitchFamily="18" charset="0"/>
+                <a:cs typeface="Times New Roman" panose="02020603050405020304" pitchFamily="18" charset="0"/>
+              </a:rPr>
+              <a:t>ses</a:t>
+            </a:r>
+            <a:r>
+              <a:rPr lang="en-US" sz="1200" dirty="0">
+                <a:solidFill>
+                  <a:srgbClr val="4E9A06"/>
+                </a:solidFill>
+                <a:latin typeface="Consolas" panose="020B0609020204030204" pitchFamily="49" charset="0"/>
+                <a:ea typeface="Cambria" panose="02040503050406030204" pitchFamily="18" charset="0"/>
+                <a:cs typeface="Times New Roman" panose="02020603050405020304" pitchFamily="18" charset="0"/>
+              </a:rPr>
+              <a:t>"</a:t>
             </a:r>
             <a:r>
               <a:rPr lang="en-US" sz="1200" dirty="0">
@@ -29481,29 +29525,40 @@
                 <a:ea typeface="Cambria" panose="02040503050406030204" pitchFamily="18" charset="0"/>
                 <a:cs typeface="Times New Roman" panose="02020603050405020304" pitchFamily="18" charset="0"/>
               </a:rPr>
-              <a:t>item, </a:t>
-            </a:r>
-            <a:r>
-              <a:rPr lang="en-US" sz="1200" dirty="0" err="1">
-                <a:solidFill>
-                  <a:srgbClr val="204A87"/>
+              <a:t>, </a:t>
+            </a:r>
+            <a:r>
+              <a:rPr lang="en-US" sz="1200" dirty="0">
+                <a:solidFill>
+                  <a:srgbClr val="4E9A06"/>
                 </a:solidFill>
                 <a:latin typeface="Consolas" panose="020B0609020204030204" pitchFamily="49" charset="0"/>
                 <a:ea typeface="Cambria" panose="02040503050406030204" pitchFamily="18" charset="0"/>
                 <a:cs typeface="Times New Roman" panose="02020603050405020304" pitchFamily="18" charset="0"/>
               </a:rPr>
-              <a:t>value.var</a:t>
-            </a:r>
-            <a:r>
-              <a:rPr lang="en-US" sz="1200" dirty="0">
-                <a:solidFill>
-                  <a:srgbClr val="204A87"/>
+              <a:t>"</a:t>
+            </a:r>
+            <a:r>
+              <a:rPr lang="en-US" sz="1200" dirty="0" err="1">
+                <a:solidFill>
+                  <a:srgbClr val="4E9A06"/>
                 </a:solidFill>
                 <a:latin typeface="Consolas" panose="020B0609020204030204" pitchFamily="49" charset="0"/>
                 <a:ea typeface="Cambria" panose="02040503050406030204" pitchFamily="18" charset="0"/>
                 <a:cs typeface="Times New Roman" panose="02020603050405020304" pitchFamily="18" charset="0"/>
               </a:rPr>
-              <a:t> =</a:t>
+              <a:t>ses</a:t>
+            </a:r>
+            <a:r>
+              <a:rPr lang="en-US" sz="1200" dirty="0">
+                <a:solidFill>
+                  <a:srgbClr val="4E9A06"/>
+                </a:solidFill>
+                <a:latin typeface="Consolas" panose="020B0609020204030204" pitchFamily="49" charset="0"/>
+                <a:ea typeface="Cambria" panose="02040503050406030204" pitchFamily="18" charset="0"/>
+                <a:cs typeface="Times New Roman" panose="02020603050405020304" pitchFamily="18" charset="0"/>
+              </a:rPr>
+              <a:t>"</a:t>
             </a:r>
             <a:r>
               <a:rPr lang="en-US" sz="1200" dirty="0">
@@ -29511,18 +29566,29 @@
                 <a:ea typeface="Cambria" panose="02040503050406030204" pitchFamily="18" charset="0"/>
                 <a:cs typeface="Times New Roman" panose="02020603050405020304" pitchFamily="18" charset="0"/>
               </a:rPr>
-              <a:t> </a:t>
-            </a:r>
-            <a:r>
-              <a:rPr lang="en-US" sz="1200" dirty="0">
-                <a:solidFill>
-                  <a:srgbClr val="4E9A06"/>
+              <a:t>), </a:t>
+            </a:r>
+            <a:r>
+              <a:rPr lang="en-US" sz="1200" dirty="0" err="1">
+                <a:solidFill>
+                  <a:srgbClr val="204A87"/>
                 </a:solidFill>
                 <a:latin typeface="Consolas" panose="020B0609020204030204" pitchFamily="49" charset="0"/>
                 <a:ea typeface="Cambria" panose="02040503050406030204" pitchFamily="18" charset="0"/>
                 <a:cs typeface="Times New Roman" panose="02020603050405020304" pitchFamily="18" charset="0"/>
               </a:rPr>
-              <a:t>"value"</a:t>
+              <a:t>names_from</a:t>
+            </a:r>
+            <a:r>
+              <a:rPr lang="en-US" sz="1200" dirty="0">
+                <a:solidFill>
+                  <a:srgbClr val="204A87"/>
+                </a:solidFill>
+                <a:latin typeface="Consolas" panose="020B0609020204030204" pitchFamily="49" charset="0"/>
+                <a:ea typeface="Cambria" panose="02040503050406030204" pitchFamily="18" charset="0"/>
+                <a:cs typeface="Times New Roman" panose="02020603050405020304" pitchFamily="18" charset="0"/>
+              </a:rPr>
+              <a:t> </a:t>
             </a:r>
             <a:r>
               <a:rPr lang="en-US" sz="1200" dirty="0">
@@ -29530,7 +29596,131 @@
                 <a:ea typeface="Cambria" panose="02040503050406030204" pitchFamily="18" charset="0"/>
                 <a:cs typeface="Times New Roman" panose="02020603050405020304" pitchFamily="18" charset="0"/>
               </a:rPr>
-              <a:t>)</a:t>
+              <a:t>= </a:t>
+            </a:r>
+            <a:r>
+              <a:rPr lang="en-US" sz="1200" dirty="0">
+                <a:solidFill>
+                  <a:srgbClr val="4E9A06"/>
+                </a:solidFill>
+                <a:latin typeface="Consolas" panose="020B0609020204030204" pitchFamily="49" charset="0"/>
+                <a:ea typeface="Cambria" panose="02040503050406030204" pitchFamily="18" charset="0"/>
+                <a:cs typeface="Times New Roman" panose="02020603050405020304" pitchFamily="18" charset="0"/>
+              </a:rPr>
+              <a:t>"item"</a:t>
+            </a:r>
+            <a:r>
+              <a:rPr lang="en-US" sz="1200" dirty="0">
+                <a:latin typeface="Consolas" panose="020B0609020204030204" pitchFamily="49" charset="0"/>
+                <a:ea typeface="Cambria" panose="02040503050406030204" pitchFamily="18" charset="0"/>
+                <a:cs typeface="Times New Roman" panose="02020603050405020304" pitchFamily="18" charset="0"/>
+              </a:rPr>
+              <a:t>, </a:t>
+            </a:r>
+            <a:br>
+              <a:rPr lang="en-US" sz="1200" dirty="0">
+                <a:latin typeface="Consolas" panose="020B0609020204030204" pitchFamily="49" charset="0"/>
+                <a:ea typeface="Cambria" panose="02040503050406030204" pitchFamily="18" charset="0"/>
+                <a:cs typeface="Times New Roman" panose="02020603050405020304" pitchFamily="18" charset="0"/>
+              </a:rPr>
+            </a:br>
+            <a:r>
+              <a:rPr lang="en-US" sz="1200" dirty="0">
+                <a:latin typeface="Consolas" panose="020B0609020204030204" pitchFamily="49" charset="0"/>
+                <a:ea typeface="Cambria" panose="02040503050406030204" pitchFamily="18" charset="0"/>
+                <a:cs typeface="Times New Roman" panose="02020603050405020304" pitchFamily="18" charset="0"/>
+              </a:rPr>
+              <a:t>            </a:t>
+            </a:r>
+            <a:r>
+              <a:rPr lang="en-US" sz="1200" dirty="0" err="1">
+                <a:solidFill>
+                  <a:srgbClr val="204A87"/>
+                </a:solidFill>
+                <a:latin typeface="Consolas" panose="020B0609020204030204" pitchFamily="49" charset="0"/>
+                <a:ea typeface="Cambria" panose="02040503050406030204" pitchFamily="18" charset="0"/>
+                <a:cs typeface="Times New Roman" panose="02020603050405020304" pitchFamily="18" charset="0"/>
+              </a:rPr>
+              <a:t>values_from</a:t>
+            </a:r>
+            <a:r>
+              <a:rPr lang="en-US" sz="1200" dirty="0">
+                <a:solidFill>
+                  <a:srgbClr val="204A87"/>
+                </a:solidFill>
+                <a:latin typeface="Consolas" panose="020B0609020204030204" pitchFamily="49" charset="0"/>
+                <a:ea typeface="Cambria" panose="02040503050406030204" pitchFamily="18" charset="0"/>
+                <a:cs typeface="Times New Roman" panose="02020603050405020304" pitchFamily="18" charset="0"/>
+              </a:rPr>
+              <a:t> =</a:t>
+            </a:r>
+            <a:r>
+              <a:rPr lang="en-US" sz="1200" dirty="0">
+                <a:latin typeface="Consolas" panose="020B0609020204030204" pitchFamily="49" charset="0"/>
+                <a:ea typeface="Cambria" panose="02040503050406030204" pitchFamily="18" charset="0"/>
+                <a:cs typeface="Times New Roman" panose="02020603050405020304" pitchFamily="18" charset="0"/>
+              </a:rPr>
+              <a:t> </a:t>
+            </a:r>
+            <a:r>
+              <a:rPr lang="en-US" sz="1200" dirty="0">
+                <a:solidFill>
+                  <a:srgbClr val="4E9A06"/>
+                </a:solidFill>
+                <a:latin typeface="Consolas" panose="020B0609020204030204" pitchFamily="49" charset="0"/>
+                <a:ea typeface="Cambria" panose="02040503050406030204" pitchFamily="18" charset="0"/>
+                <a:cs typeface="Times New Roman" panose="02020603050405020304" pitchFamily="18" charset="0"/>
+              </a:rPr>
+              <a:t>"value"</a:t>
+            </a:r>
+            <a:r>
+              <a:rPr lang="en-US" sz="1200" dirty="0">
+                <a:latin typeface="Consolas" panose="020B0609020204030204" pitchFamily="49" charset="0"/>
+                <a:ea typeface="Cambria" panose="02040503050406030204" pitchFamily="18" charset="0"/>
+                <a:cs typeface="Times New Roman" panose="02020603050405020304" pitchFamily="18" charset="0"/>
+              </a:rPr>
+              <a:t>) </a:t>
+            </a:r>
+            <a:r>
+              <a:rPr lang="en-US" sz="1200" b="1" dirty="0">
+                <a:solidFill>
+                  <a:srgbClr val="CE5C00"/>
+                </a:solidFill>
+                <a:latin typeface="Consolas" panose="020B0609020204030204" pitchFamily="49" charset="0"/>
+                <a:ea typeface="Cambria" panose="02040503050406030204" pitchFamily="18" charset="0"/>
+                <a:cs typeface="Times New Roman" panose="02020603050405020304" pitchFamily="18" charset="0"/>
+              </a:rPr>
+              <a:t>%&gt;%</a:t>
+            </a:r>
+            <a:r>
+              <a:rPr lang="en-US" sz="1200" b="1" dirty="0">
+                <a:solidFill>
+                  <a:srgbClr val="204A87"/>
+                </a:solidFill>
+                <a:latin typeface="Consolas" panose="020B0609020204030204" pitchFamily="49" charset="0"/>
+                <a:ea typeface="Cambria" panose="02040503050406030204" pitchFamily="18" charset="0"/>
+                <a:cs typeface="Times New Roman" panose="02020603050405020304" pitchFamily="18" charset="0"/>
+              </a:rPr>
+              <a:t> </a:t>
+            </a:r>
+            <a:r>
+              <a:rPr lang="en-US" sz="1200" b="1" dirty="0" err="1">
+                <a:solidFill>
+                  <a:srgbClr val="204A87"/>
+                </a:solidFill>
+                <a:latin typeface="Consolas" panose="020B0609020204030204" pitchFamily="49" charset="0"/>
+                <a:ea typeface="Cambria" panose="02040503050406030204" pitchFamily="18" charset="0"/>
+                <a:cs typeface="Times New Roman" panose="02020603050405020304" pitchFamily="18" charset="0"/>
+              </a:rPr>
+              <a:t>as.data.frame</a:t>
+            </a:r>
+            <a:r>
+              <a:rPr lang="en-US" sz="1200" dirty="0">
+                <a:latin typeface="Consolas" panose="020B0609020204030204" pitchFamily="49" charset="0"/>
+                <a:ea typeface="Cambria" panose="02040503050406030204" pitchFamily="18" charset="0"/>
+                <a:cs typeface="Times New Roman" panose="02020603050405020304" pitchFamily="18" charset="0"/>
+              </a:rPr>
+              <a:t> ()</a:t>
             </a:r>
             <a:br>
               <a:rPr lang="en-US" sz="1200" dirty="0">
@@ -29817,6 +30007,305 @@
               </a:rPr>
               <a:t>)])</a:t>
             </a:r>
+            <a:br>
+              <a:rPr lang="en-US" sz="1200" dirty="0">
+                <a:latin typeface="Consolas" panose="020B0609020204030204" pitchFamily="49" charset="0"/>
+                <a:ea typeface="Cambria" panose="02040503050406030204" pitchFamily="18" charset="0"/>
+                <a:cs typeface="Times New Roman" panose="02020603050405020304" pitchFamily="18" charset="0"/>
+              </a:rPr>
+            </a:br>
+            <a:br>
+              <a:rPr lang="en-US" sz="1200" dirty="0">
+                <a:latin typeface="Consolas" panose="020B0609020204030204" pitchFamily="49" charset="0"/>
+                <a:ea typeface="Cambria" panose="02040503050406030204" pitchFamily="18" charset="0"/>
+                <a:cs typeface="Times New Roman" panose="02020603050405020304" pitchFamily="18" charset="0"/>
+              </a:rPr>
+            </a:br>
+            <a:r>
+              <a:rPr lang="en-US" sz="1200" i="1" dirty="0">
+                <a:solidFill>
+                  <a:srgbClr val="8F5902"/>
+                </a:solidFill>
+                <a:latin typeface="Consolas" panose="020B0609020204030204" pitchFamily="49" charset="0"/>
+                <a:ea typeface="Cambria" panose="02040503050406030204" pitchFamily="18" charset="0"/>
+                <a:cs typeface="Times New Roman" panose="02020603050405020304" pitchFamily="18" charset="0"/>
+              </a:rPr>
+              <a:t># Q Matrix </a:t>
+            </a:r>
+            <a:r>
+              <a:rPr lang="en-US" sz="1200" i="1" dirty="0" err="1">
+                <a:solidFill>
+                  <a:srgbClr val="8F5902"/>
+                </a:solidFill>
+                <a:latin typeface="Consolas" panose="020B0609020204030204" pitchFamily="49" charset="0"/>
+                <a:ea typeface="Cambria" panose="02040503050406030204" pitchFamily="18" charset="0"/>
+                <a:cs typeface="Times New Roman" panose="02020603050405020304" pitchFamily="18" charset="0"/>
+              </a:rPr>
+              <a:t>enthaelt</a:t>
+            </a:r>
+            <a:r>
+              <a:rPr lang="en-US" sz="1200" i="1" dirty="0">
+                <a:solidFill>
+                  <a:srgbClr val="8F5902"/>
+                </a:solidFill>
+                <a:latin typeface="Consolas" panose="020B0609020204030204" pitchFamily="49" charset="0"/>
+                <a:ea typeface="Cambria" panose="02040503050406030204" pitchFamily="18" charset="0"/>
+                <a:cs typeface="Times New Roman" panose="02020603050405020304" pitchFamily="18" charset="0"/>
+              </a:rPr>
+              <a:t> </a:t>
+            </a:r>
+            <a:r>
+              <a:rPr lang="en-US" sz="1200" i="1" dirty="0" err="1">
+                <a:solidFill>
+                  <a:srgbClr val="8F5902"/>
+                </a:solidFill>
+                <a:latin typeface="Consolas" panose="020B0609020204030204" pitchFamily="49" charset="0"/>
+                <a:ea typeface="Cambria" panose="02040503050406030204" pitchFamily="18" charset="0"/>
+                <a:cs typeface="Times New Roman" panose="02020603050405020304" pitchFamily="18" charset="0"/>
+              </a:rPr>
+              <a:t>Zuordnung</a:t>
+            </a:r>
+            <a:r>
+              <a:rPr lang="en-US" sz="1200" i="1" dirty="0">
+                <a:solidFill>
+                  <a:srgbClr val="8F5902"/>
+                </a:solidFill>
+                <a:latin typeface="Consolas" panose="020B0609020204030204" pitchFamily="49" charset="0"/>
+                <a:ea typeface="Cambria" panose="02040503050406030204" pitchFamily="18" charset="0"/>
+                <a:cs typeface="Times New Roman" panose="02020603050405020304" pitchFamily="18" charset="0"/>
+              </a:rPr>
+              <a:t> der Items </a:t>
+            </a:r>
+            <a:r>
+              <a:rPr lang="en-US" sz="1200" i="1" dirty="0" err="1">
+                <a:solidFill>
+                  <a:srgbClr val="8F5902"/>
+                </a:solidFill>
+                <a:latin typeface="Consolas" panose="020B0609020204030204" pitchFamily="49" charset="0"/>
+                <a:ea typeface="Cambria" panose="02040503050406030204" pitchFamily="18" charset="0"/>
+                <a:cs typeface="Times New Roman" panose="02020603050405020304" pitchFamily="18" charset="0"/>
+              </a:rPr>
+              <a:t>zu</a:t>
+            </a:r>
+            <a:r>
+              <a:rPr lang="en-US" sz="1200" i="1" dirty="0">
+                <a:solidFill>
+                  <a:srgbClr val="8F5902"/>
+                </a:solidFill>
+                <a:latin typeface="Consolas" panose="020B0609020204030204" pitchFamily="49" charset="0"/>
+                <a:ea typeface="Cambria" panose="02040503050406030204" pitchFamily="18" charset="0"/>
+                <a:cs typeface="Times New Roman" panose="02020603050405020304" pitchFamily="18" charset="0"/>
+              </a:rPr>
+              <a:t> </a:t>
+            </a:r>
+            <a:r>
+              <a:rPr lang="en-US" sz="1200" i="1" dirty="0" err="1">
+                <a:solidFill>
+                  <a:srgbClr val="8F5902"/>
+                </a:solidFill>
+                <a:latin typeface="Consolas" panose="020B0609020204030204" pitchFamily="49" charset="0"/>
+                <a:ea typeface="Cambria" panose="02040503050406030204" pitchFamily="18" charset="0"/>
+                <a:cs typeface="Times New Roman" panose="02020603050405020304" pitchFamily="18" charset="0"/>
+              </a:rPr>
+              <a:t>Dimensionen</a:t>
+            </a:r>
+            <a:r>
+              <a:rPr lang="en-US" sz="1200" i="1" dirty="0">
+                <a:solidFill>
+                  <a:srgbClr val="8F5902"/>
+                </a:solidFill>
+                <a:latin typeface="Consolas" panose="020B0609020204030204" pitchFamily="49" charset="0"/>
+                <a:ea typeface="Cambria" panose="02040503050406030204" pitchFamily="18" charset="0"/>
+                <a:cs typeface="Times New Roman" panose="02020603050405020304" pitchFamily="18" charset="0"/>
+              </a:rPr>
+              <a:t> </a:t>
+            </a:r>
+            <a:br>
+              <a:rPr lang="en-US" sz="1200" i="1" dirty="0">
+                <a:solidFill>
+                  <a:srgbClr val="8F5902"/>
+                </a:solidFill>
+                <a:latin typeface="Consolas" panose="020B0609020204030204" pitchFamily="49" charset="0"/>
+                <a:ea typeface="Cambria" panose="02040503050406030204" pitchFamily="18" charset="0"/>
+                <a:cs typeface="Times New Roman" panose="02020603050405020304" pitchFamily="18" charset="0"/>
+              </a:rPr>
+            </a:br>
+            <a:r>
+              <a:rPr lang="en-US" sz="1200" dirty="0" err="1">
+                <a:latin typeface="Consolas" panose="020B0609020204030204" pitchFamily="49" charset="0"/>
+                <a:ea typeface="Cambria" panose="02040503050406030204" pitchFamily="18" charset="0"/>
+                <a:cs typeface="Times New Roman" panose="02020603050405020304" pitchFamily="18" charset="0"/>
+              </a:rPr>
+              <a:t>qmat</a:t>
+            </a:r>
+            <a:r>
+              <a:rPr lang="en-US" sz="1200" dirty="0">
+                <a:latin typeface="Consolas" panose="020B0609020204030204" pitchFamily="49" charset="0"/>
+                <a:ea typeface="Cambria" panose="02040503050406030204" pitchFamily="18" charset="0"/>
+                <a:cs typeface="Times New Roman" panose="02020603050405020304" pitchFamily="18" charset="0"/>
+              </a:rPr>
+              <a:t> </a:t>
+            </a:r>
+            <a:r>
+              <a:rPr lang="en-US" sz="1200" dirty="0">
+                <a:solidFill>
+                  <a:srgbClr val="8F5902"/>
+                </a:solidFill>
+                <a:latin typeface="Consolas" panose="020B0609020204030204" pitchFamily="49" charset="0"/>
+                <a:ea typeface="Cambria" panose="02040503050406030204" pitchFamily="18" charset="0"/>
+                <a:cs typeface="Times New Roman" panose="02020603050405020304" pitchFamily="18" charset="0"/>
+              </a:rPr>
+              <a:t>&lt;-</a:t>
+            </a:r>
+            <a:r>
+              <a:rPr lang="en-US" sz="1200" dirty="0">
+                <a:latin typeface="Consolas" panose="020B0609020204030204" pitchFamily="49" charset="0"/>
+                <a:ea typeface="Cambria" panose="02040503050406030204" pitchFamily="18" charset="0"/>
+                <a:cs typeface="Times New Roman" panose="02020603050405020304" pitchFamily="18" charset="0"/>
+              </a:rPr>
+              <a:t> </a:t>
+            </a:r>
+            <a:r>
+              <a:rPr lang="en-US" sz="1200" b="1" dirty="0" err="1">
+                <a:solidFill>
+                  <a:srgbClr val="204A87"/>
+                </a:solidFill>
+                <a:latin typeface="Consolas" panose="020B0609020204030204" pitchFamily="49" charset="0"/>
+                <a:ea typeface="Cambria" panose="02040503050406030204" pitchFamily="18" charset="0"/>
+                <a:cs typeface="Times New Roman" panose="02020603050405020304" pitchFamily="18" charset="0"/>
+              </a:rPr>
+              <a:t>data.frame</a:t>
+            </a:r>
+            <a:r>
+              <a:rPr lang="en-US" sz="1200" dirty="0">
+                <a:latin typeface="Consolas" panose="020B0609020204030204" pitchFamily="49" charset="0"/>
+                <a:ea typeface="Cambria" panose="02040503050406030204" pitchFamily="18" charset="0"/>
+                <a:cs typeface="Times New Roman" panose="02020603050405020304" pitchFamily="18" charset="0"/>
+              </a:rPr>
+              <a:t>(</a:t>
+            </a:r>
+            <a:r>
+              <a:rPr lang="en-US" sz="1200" dirty="0" err="1">
+                <a:latin typeface="Consolas" panose="020B0609020204030204" pitchFamily="49" charset="0"/>
+                <a:ea typeface="Cambria" panose="02040503050406030204" pitchFamily="18" charset="0"/>
+                <a:cs typeface="Times New Roman" panose="02020603050405020304" pitchFamily="18" charset="0"/>
+              </a:rPr>
+              <a:t>item_info</a:t>
+            </a:r>
+            <a:r>
+              <a:rPr lang="en-US" sz="1200" dirty="0">
+                <a:latin typeface="Consolas" panose="020B0609020204030204" pitchFamily="49" charset="0"/>
+                <a:ea typeface="Cambria" panose="02040503050406030204" pitchFamily="18" charset="0"/>
+                <a:cs typeface="Times New Roman" panose="02020603050405020304" pitchFamily="18" charset="0"/>
+              </a:rPr>
+              <a:t>, </a:t>
+            </a:r>
+            <a:r>
+              <a:rPr lang="en-US" sz="1200" b="1" dirty="0" err="1">
+                <a:solidFill>
+                  <a:srgbClr val="204A87"/>
+                </a:solidFill>
+                <a:latin typeface="Consolas" panose="020B0609020204030204" pitchFamily="49" charset="0"/>
+                <a:ea typeface="Cambria" panose="02040503050406030204" pitchFamily="18" charset="0"/>
+                <a:cs typeface="Times New Roman" panose="02020603050405020304" pitchFamily="18" charset="0"/>
+              </a:rPr>
+              <a:t>model.matrix</a:t>
+            </a:r>
+            <a:r>
+              <a:rPr lang="en-US" sz="1200" dirty="0">
+                <a:latin typeface="Consolas" panose="020B0609020204030204" pitchFamily="49" charset="0"/>
+                <a:ea typeface="Cambria" panose="02040503050406030204" pitchFamily="18" charset="0"/>
+                <a:cs typeface="Times New Roman" panose="02020603050405020304" pitchFamily="18" charset="0"/>
+              </a:rPr>
+              <a:t>(</a:t>
+            </a:r>
+            <a:r>
+              <a:rPr lang="en-US" sz="1200" b="1" dirty="0">
+                <a:solidFill>
+                  <a:srgbClr val="CE5C00"/>
+                </a:solidFill>
+                <a:latin typeface="Consolas" panose="020B0609020204030204" pitchFamily="49" charset="0"/>
+                <a:ea typeface="Cambria" panose="02040503050406030204" pitchFamily="18" charset="0"/>
+                <a:cs typeface="Times New Roman" panose="02020603050405020304" pitchFamily="18" charset="0"/>
+              </a:rPr>
+              <a:t>~</a:t>
+            </a:r>
+            <a:r>
+              <a:rPr lang="en-US" sz="1200" dirty="0">
+                <a:latin typeface="Consolas" panose="020B0609020204030204" pitchFamily="49" charset="0"/>
+                <a:ea typeface="Cambria" panose="02040503050406030204" pitchFamily="18" charset="0"/>
+                <a:cs typeface="Times New Roman" panose="02020603050405020304" pitchFamily="18" charset="0"/>
+              </a:rPr>
+              <a:t>domain </a:t>
+            </a:r>
+            <a:r>
+              <a:rPr lang="en-US" sz="1200" b="1" dirty="0">
+                <a:solidFill>
+                  <a:srgbClr val="CE5C00"/>
+                </a:solidFill>
+                <a:latin typeface="Consolas" panose="020B0609020204030204" pitchFamily="49" charset="0"/>
+                <a:ea typeface="Cambria" panose="02040503050406030204" pitchFamily="18" charset="0"/>
+                <a:cs typeface="Times New Roman" panose="02020603050405020304" pitchFamily="18" charset="0"/>
+              </a:rPr>
+              <a:t>-</a:t>
+            </a:r>
+            <a:r>
+              <a:rPr lang="en-US" sz="1200" dirty="0">
+                <a:latin typeface="Consolas" panose="020B0609020204030204" pitchFamily="49" charset="0"/>
+                <a:ea typeface="Cambria" panose="02040503050406030204" pitchFamily="18" charset="0"/>
+                <a:cs typeface="Times New Roman" panose="02020603050405020304" pitchFamily="18" charset="0"/>
+              </a:rPr>
+              <a:t> 1, </a:t>
+            </a:r>
+            <a:r>
+              <a:rPr lang="en-US" sz="1200" b="1" dirty="0">
+                <a:solidFill>
+                  <a:srgbClr val="204A87"/>
+                </a:solidFill>
+                <a:latin typeface="Consolas" panose="020B0609020204030204" pitchFamily="49" charset="0"/>
+                <a:ea typeface="Cambria" panose="02040503050406030204" pitchFamily="18" charset="0"/>
+                <a:cs typeface="Times New Roman" panose="02020603050405020304" pitchFamily="18" charset="0"/>
+              </a:rPr>
+              <a:t>data </a:t>
+            </a:r>
+            <a:r>
+              <a:rPr lang="en-US" sz="1200" dirty="0">
+                <a:latin typeface="Consolas" panose="020B0609020204030204" pitchFamily="49" charset="0"/>
+                <a:ea typeface="Cambria" panose="02040503050406030204" pitchFamily="18" charset="0"/>
+                <a:cs typeface="Times New Roman" panose="02020603050405020304" pitchFamily="18" charset="0"/>
+              </a:rPr>
+              <a:t>= </a:t>
+            </a:r>
+            <a:r>
+              <a:rPr lang="en-US" sz="1200" dirty="0" err="1">
+                <a:latin typeface="Consolas" panose="020B0609020204030204" pitchFamily="49" charset="0"/>
+                <a:ea typeface="Cambria" panose="02040503050406030204" pitchFamily="18" charset="0"/>
+                <a:cs typeface="Times New Roman" panose="02020603050405020304" pitchFamily="18" charset="0"/>
+              </a:rPr>
+              <a:t>item_info</a:t>
+            </a:r>
+            <a:r>
+              <a:rPr lang="en-US" sz="1200" dirty="0">
+                <a:latin typeface="Consolas" panose="020B0609020204030204" pitchFamily="49" charset="0"/>
+                <a:ea typeface="Cambria" panose="02040503050406030204" pitchFamily="18" charset="0"/>
+                <a:cs typeface="Times New Roman" panose="02020603050405020304" pitchFamily="18" charset="0"/>
+              </a:rPr>
+              <a:t>))</a:t>
+            </a:r>
+            <a:br>
+              <a:rPr lang="en-US" sz="1200" dirty="0">
+                <a:latin typeface="Consolas" panose="020B0609020204030204" pitchFamily="49" charset="0"/>
+                <a:ea typeface="Cambria" panose="02040503050406030204" pitchFamily="18" charset="0"/>
+                <a:cs typeface="Times New Roman" panose="02020603050405020304" pitchFamily="18" charset="0"/>
+              </a:rPr>
+            </a:br>
+            <a:br>
+              <a:rPr lang="en-US" sz="1200" dirty="0">
+                <a:latin typeface="Consolas" panose="020B0609020204030204" pitchFamily="49" charset="0"/>
+                <a:ea typeface="Cambria" panose="02040503050406030204" pitchFamily="18" charset="0"/>
+                <a:cs typeface="Times New Roman" panose="02020603050405020304" pitchFamily="18" charset="0"/>
+              </a:rPr>
+            </a:br>
             <a:endParaRPr lang="de-DE" sz="1200" dirty="0">
               <a:latin typeface="Consolas" panose="020B0609020204030204" pitchFamily="49" charset="0"/>
               <a:ea typeface="Cambria" panose="02040503050406030204" pitchFamily="18" charset="0"/>
@@ -31430,7 +31919,7 @@
           <a:graphicData uri="http://schemas.openxmlformats.org/presentationml/2006/ole">
             <mc:AlternateContent xmlns:mc="http://schemas.openxmlformats.org/markup-compatibility/2006">
               <mc:Choice xmlns:v="urn:schemas-microsoft-com:vml" Requires="v">
-                <p:oleObj spid="_x0000_s357379" name="Formel" r:id="rId4" imgW="2628720" imgH="241200" progId="Equation.3">
+                <p:oleObj spid="_x0000_s357381" name="Formel" r:id="rId4" imgW="2628720" imgH="241200" progId="Equation.3">
                   <p:embed/>
                 </p:oleObj>
               </mc:Choice>
@@ -37657,7 +38146,7 @@
           <a:graphicData uri="http://schemas.openxmlformats.org/presentationml/2006/ole">
             <mc:AlternateContent xmlns:mc="http://schemas.openxmlformats.org/markup-compatibility/2006">
               <mc:Choice xmlns:v="urn:schemas-microsoft-com:vml" Requires="v">
-                <p:oleObj spid="_x0000_s355338" name="Formel" r:id="rId5" imgW="1638300" imgH="228600" progId="Equation.3">
+                <p:oleObj spid="_x0000_s355340" name="Formel" r:id="rId5" imgW="1638300" imgH="228600" progId="Equation.3">
                   <p:embed/>
                 </p:oleObj>
               </mc:Choice>
@@ -39347,7 +39836,7 @@
           <a:graphicData uri="http://schemas.openxmlformats.org/presentationml/2006/ole">
             <mc:AlternateContent xmlns:mc="http://schemas.openxmlformats.org/markup-compatibility/2006">
               <mc:Choice xmlns:v="urn:schemas-microsoft-com:vml" Requires="v">
-                <p:oleObj spid="_x0000_s356362" name="Formel" r:id="rId5" imgW="1714320" imgH="228600" progId="Equation.3">
+                <p:oleObj spid="_x0000_s356364" name="Formel" r:id="rId5" imgW="1714320" imgH="228600" progId="Equation.3">
                   <p:embed/>
                 </p:oleObj>
               </mc:Choice>

</xml_diff>